<commit_message>
Correções em relação ao Cap3 - modificações no texto inicial e na figura sobre a estrutura do modelo operacional
</commit_message>
<xml_diff>
--- a/figuras/Fig2.pptx
+++ b/figuras/Fig2.pptx
@@ -304,7 +304,7 @@
           <a:p>
             <a:fld id="{24600E32-1EDA-9448-8110-B067D99F7BD4}" type="datetimeFigureOut">
               <a:rPr lang="en-US" smtClean="0"/>
-              <a:t>4/25/2016</a:t>
+              <a:t>10/20/2016</a:t>
             </a:fld>
             <a:endParaRPr lang="en-US"/>
           </a:p>
@@ -474,7 +474,7 @@
           <a:p>
             <a:fld id="{24600E32-1EDA-9448-8110-B067D99F7BD4}" type="datetimeFigureOut">
               <a:rPr lang="en-US" smtClean="0"/>
-              <a:t>4/25/2016</a:t>
+              <a:t>10/20/2016</a:t>
             </a:fld>
             <a:endParaRPr lang="en-US"/>
           </a:p>
@@ -654,7 +654,7 @@
           <a:p>
             <a:fld id="{24600E32-1EDA-9448-8110-B067D99F7BD4}" type="datetimeFigureOut">
               <a:rPr lang="en-US" smtClean="0"/>
-              <a:t>4/25/2016</a:t>
+              <a:t>10/20/2016</a:t>
             </a:fld>
             <a:endParaRPr lang="en-US"/>
           </a:p>
@@ -824,7 +824,7 @@
           <a:p>
             <a:fld id="{24600E32-1EDA-9448-8110-B067D99F7BD4}" type="datetimeFigureOut">
               <a:rPr lang="en-US" smtClean="0"/>
-              <a:t>4/25/2016</a:t>
+              <a:t>10/20/2016</a:t>
             </a:fld>
             <a:endParaRPr lang="en-US"/>
           </a:p>
@@ -1070,7 +1070,7 @@
           <a:p>
             <a:fld id="{24600E32-1EDA-9448-8110-B067D99F7BD4}" type="datetimeFigureOut">
               <a:rPr lang="en-US" smtClean="0"/>
-              <a:t>4/25/2016</a:t>
+              <a:t>10/20/2016</a:t>
             </a:fld>
             <a:endParaRPr lang="en-US"/>
           </a:p>
@@ -1358,7 +1358,7 @@
           <a:p>
             <a:fld id="{24600E32-1EDA-9448-8110-B067D99F7BD4}" type="datetimeFigureOut">
               <a:rPr lang="en-US" smtClean="0"/>
-              <a:t>4/25/2016</a:t>
+              <a:t>10/20/2016</a:t>
             </a:fld>
             <a:endParaRPr lang="en-US"/>
           </a:p>
@@ -1780,7 +1780,7 @@
           <a:p>
             <a:fld id="{24600E32-1EDA-9448-8110-B067D99F7BD4}" type="datetimeFigureOut">
               <a:rPr lang="en-US" smtClean="0"/>
-              <a:t>4/25/2016</a:t>
+              <a:t>10/20/2016</a:t>
             </a:fld>
             <a:endParaRPr lang="en-US"/>
           </a:p>
@@ -1898,7 +1898,7 @@
           <a:p>
             <a:fld id="{24600E32-1EDA-9448-8110-B067D99F7BD4}" type="datetimeFigureOut">
               <a:rPr lang="en-US" smtClean="0"/>
-              <a:t>4/25/2016</a:t>
+              <a:t>10/20/2016</a:t>
             </a:fld>
             <a:endParaRPr lang="en-US"/>
           </a:p>
@@ -1993,7 +1993,7 @@
           <a:p>
             <a:fld id="{24600E32-1EDA-9448-8110-B067D99F7BD4}" type="datetimeFigureOut">
               <a:rPr lang="en-US" smtClean="0"/>
-              <a:t>4/25/2016</a:t>
+              <a:t>10/20/2016</a:t>
             </a:fld>
             <a:endParaRPr lang="en-US"/>
           </a:p>
@@ -2270,7 +2270,7 @@
           <a:p>
             <a:fld id="{24600E32-1EDA-9448-8110-B067D99F7BD4}" type="datetimeFigureOut">
               <a:rPr lang="en-US" smtClean="0"/>
-              <a:t>4/25/2016</a:t>
+              <a:t>10/20/2016</a:t>
             </a:fld>
             <a:endParaRPr lang="en-US"/>
           </a:p>
@@ -2523,7 +2523,7 @@
           <a:p>
             <a:fld id="{24600E32-1EDA-9448-8110-B067D99F7BD4}" type="datetimeFigureOut">
               <a:rPr lang="en-US" smtClean="0"/>
-              <a:t>4/25/2016</a:t>
+              <a:t>10/20/2016</a:t>
             </a:fld>
             <a:endParaRPr lang="en-US"/>
           </a:p>
@@ -2736,7 +2736,7 @@
           <a:p>
             <a:fld id="{24600E32-1EDA-9448-8110-B067D99F7BD4}" type="datetimeFigureOut">
               <a:rPr lang="en-US" smtClean="0"/>
-              <a:t>4/25/2016</a:t>
+              <a:t>10/20/2016</a:t>
             </a:fld>
             <a:endParaRPr lang="en-US"/>
           </a:p>
@@ -3111,6 +3111,61 @@
           <a:chExt cx="0" cy="0"/>
         </a:xfrm>
       </p:grpSpPr>
+      <p:sp>
+        <p:nvSpPr>
+          <p:cNvPr id="33" name="Process 35"/>
+          <p:cNvSpPr/>
+          <p:nvPr/>
+        </p:nvSpPr>
+        <p:spPr>
+          <a:xfrm>
+            <a:off x="3046352" y="2176915"/>
+            <a:ext cx="1250550" cy="504645"/>
+          </a:xfrm>
+          <a:prstGeom prst="flowChartProcess">
+            <a:avLst/>
+          </a:prstGeom>
+          <a:solidFill>
+            <a:schemeClr val="bg1">
+              <a:lumMod val="85000"/>
+            </a:schemeClr>
+          </a:solidFill>
+          <a:ln w="6350" cmpd="sng">
+            <a:solidFill>
+              <a:schemeClr val="tx1"/>
+            </a:solidFill>
+          </a:ln>
+          <a:effectLst/>
+        </p:spPr>
+        <p:style>
+          <a:lnRef idx="1">
+            <a:schemeClr val="accent1"/>
+          </a:lnRef>
+          <a:fillRef idx="3">
+            <a:schemeClr val="accent1"/>
+          </a:fillRef>
+          <a:effectRef idx="2">
+            <a:schemeClr val="accent1"/>
+          </a:effectRef>
+          <a:fontRef idx="minor">
+            <a:schemeClr val="lt1"/>
+          </a:fontRef>
+        </p:style>
+        <p:txBody>
+          <a:bodyPr rtlCol="0" anchor="ctr"/>
+          <a:lstStyle/>
+          <a:p>
+            <a:pPr algn="ctr"/>
+            <a:endParaRPr lang="en-GB" sz="1200" dirty="0">
+              <a:solidFill>
+                <a:schemeClr val="tx1"/>
+              </a:solidFill>
+              <a:latin typeface="Arial"/>
+              <a:cs typeface="Arial"/>
+            </a:endParaRPr>
+          </a:p>
+        </p:txBody>
+      </p:sp>
       <p:grpSp>
         <p:nvGrpSpPr>
           <p:cNvPr id="10" name="Group 9"/>
@@ -3119,10 +3174,10 @@
         </p:nvGrpSpPr>
         <p:grpSpPr>
           <a:xfrm>
-            <a:off x="257171" y="1394160"/>
-            <a:ext cx="8782026" cy="2938186"/>
-            <a:chOff x="257171" y="1394160"/>
-            <a:chExt cx="8782026" cy="2938186"/>
+            <a:off x="257171" y="1355722"/>
+            <a:ext cx="8782026" cy="2976624"/>
+            <a:chOff x="257171" y="1355722"/>
+            <a:chExt cx="8782026" cy="2976624"/>
           </a:xfrm>
         </p:grpSpPr>
         <p:sp>
@@ -4211,8 +4266,8 @@
           </p:nvSpPr>
           <p:spPr>
             <a:xfrm>
-              <a:off x="2949778" y="1394160"/>
-              <a:ext cx="1385221" cy="461665"/>
+              <a:off x="2656080" y="1355722"/>
+              <a:ext cx="2122450" cy="461665"/>
             </a:xfrm>
             <a:prstGeom prst="rect">
               <a:avLst/>
@@ -4231,7 +4286,42 @@
                   <a:latin typeface="Arial"/>
                   <a:cs typeface="Arial"/>
                 </a:rPr>
-                <a:t>Adição</a:t>
+                <a:t>Pré</a:t>
+              </a:r>
+              <a:r>
+                <a:rPr lang="en-GB" sz="1200" dirty="0" smtClean="0">
+                  <a:latin typeface="Arial"/>
+                  <a:cs typeface="Arial"/>
+                </a:rPr>
+                <a:t> e </a:t>
+              </a:r>
+              <a:r>
+                <a:rPr lang="en-GB" sz="1200" dirty="0" err="1" smtClean="0">
+                  <a:latin typeface="Arial"/>
+                  <a:cs typeface="Arial"/>
+                </a:rPr>
+                <a:t>Pós-condições</a:t>
+              </a:r>
+              <a:r>
+                <a:rPr lang="en-GB" sz="1200" dirty="0" smtClean="0">
+                  <a:latin typeface="Arial"/>
+                  <a:cs typeface="Arial"/>
+                </a:rPr>
+                <a:t> e </a:t>
+              </a:r>
+              <a:endParaRPr lang="en-GB" sz="1200" dirty="0" smtClean="0">
+                <a:latin typeface="Arial"/>
+                <a:cs typeface="Arial"/>
+              </a:endParaRPr>
+            </a:p>
+            <a:p>
+              <a:pPr algn="ctr"/>
+              <a:r>
+                <a:rPr lang="en-GB" sz="1200" dirty="0" err="1" smtClean="0">
+                  <a:latin typeface="Arial"/>
+                  <a:cs typeface="Arial"/>
+                </a:rPr>
+                <a:t>Representações</a:t>
               </a:r>
               <a:r>
                 <a:rPr lang="en-GB" sz="1200" dirty="0" smtClean="0">
@@ -4245,9 +4335,9 @@
                   <a:latin typeface="Arial"/>
                   <a:cs typeface="Arial"/>
                 </a:rPr>
-                <a:t>assertivas</a:t>
+                <a:t>Qt</a:t>
               </a:r>
-              <a:endParaRPr lang="en-GB" sz="1200" dirty="0">
+              <a:endParaRPr lang="en-GB" sz="1200" dirty="0" smtClean="0">
                 <a:latin typeface="Arial"/>
                 <a:cs typeface="Arial"/>
               </a:endParaRPr>
@@ -4341,10 +4431,10 @@
           </p:nvGrpSpPr>
           <p:grpSpPr>
             <a:xfrm>
-              <a:off x="1553790" y="2323761"/>
-              <a:ext cx="1530659" cy="297541"/>
-              <a:chOff x="1553790" y="2020922"/>
-              <a:chExt cx="1530659" cy="297541"/>
+              <a:off x="1545251" y="2323761"/>
+              <a:ext cx="1491576" cy="297541"/>
+              <a:chOff x="1545251" y="2020922"/>
+              <a:chExt cx="1491576" cy="297541"/>
             </a:xfrm>
           </p:grpSpPr>
           <p:cxnSp>
@@ -4356,7 +4446,7 @@
             <p:spPr>
               <a:xfrm>
                 <a:off x="1553790" y="2020922"/>
-                <a:ext cx="1529673" cy="0"/>
+                <a:ext cx="1480907" cy="0"/>
               </a:xfrm>
               <a:prstGeom prst="straightConnector1">
                 <a:avLst/>
@@ -4393,8 +4483,8 @@
             </p:nvCxnSpPr>
             <p:spPr>
               <a:xfrm>
-                <a:off x="1554776" y="2174043"/>
-                <a:ext cx="1529673" cy="0"/>
+                <a:off x="1545251" y="2183875"/>
+                <a:ext cx="1489446" cy="0"/>
               </a:xfrm>
               <a:prstGeom prst="straightConnector1">
                 <a:avLst/>
@@ -4432,7 +4522,7 @@
             <p:spPr>
               <a:xfrm>
                 <a:off x="1554776" y="2318463"/>
-                <a:ext cx="1529673" cy="0"/>
+                <a:ext cx="1482051" cy="0"/>
               </a:xfrm>
               <a:prstGeom prst="straightConnector1">
                 <a:avLst/>

</xml_diff>